<commit_message>
added some more example content
</commit_message>
<xml_diff>
--- a/site/src/files/assets/img/best-practices/bild.pptx
+++ b/site/src/files/assets/img/best-practices/bild.pptx
@@ -5,21 +5,22 @@
     <p:sldMasterId id="2147483648" r:id="rId1"/>
   </p:sldMasterIdLst>
   <p:notesMasterIdLst>
-    <p:notesMasterId r:id="rId6"/>
+    <p:notesMasterId r:id="rId7"/>
   </p:notesMasterIdLst>
   <p:handoutMasterIdLst>
-    <p:handoutMasterId r:id="rId7"/>
+    <p:handoutMasterId r:id="rId8"/>
   </p:handoutMasterIdLst>
   <p:sldIdLst>
     <p:sldId id="417" r:id="rId2"/>
     <p:sldId id="423" r:id="rId3"/>
     <p:sldId id="424" r:id="rId4"/>
     <p:sldId id="425" r:id="rId5"/>
+    <p:sldId id="426" r:id="rId6"/>
   </p:sldIdLst>
   <p:sldSz cx="9144000" cy="6858000" type="screen4x3"/>
   <p:notesSz cx="6797675" cy="9928225"/>
   <p:custDataLst>
-    <p:tags r:id="rId8"/>
+    <p:tags r:id="rId9"/>
   </p:custDataLst>
   <p:defaultTextStyle>
     <a:defPPr>
@@ -247,7 +248,7 @@
             <a:fld id="{80F06307-6088-4DFD-BB97-31C1E3C8F94D}" type="datetimeFigureOut">
               <a:rPr lang="en-US" smtClean="0"/>
               <a:pPr/>
-              <a:t>5/10/2013</a:t>
+              <a:t>5/11/2013</a:t>
             </a:fld>
             <a:endParaRPr lang="de-DE"/>
           </a:p>
@@ -418,7 +419,7 @@
             <a:fld id="{56E7BBA9-3E9F-478E-BBF6-AD90C451F165}" type="datetimeFigureOut">
               <a:rPr lang="en-GB" smtClean="0"/>
               <a:pPr/>
-              <a:t>10/05/2013</a:t>
+              <a:t>11/05/2013</a:t>
             </a:fld>
             <a:endParaRPr lang="en-GB"/>
           </a:p>
@@ -792,7 +793,7 @@
           <a:graphicData uri="http://schemas.openxmlformats.org/presentationml/2006/ole">
             <mc:AlternateContent xmlns:mc="http://schemas.openxmlformats.org/markup-compatibility/2006">
               <mc:Choice xmlns:v="urn:schemas-microsoft-com:vml" Requires="v">
-                <p:oleObj spid="_x0000_s1893" name="think-cell Slide" r:id="rId8" imgW="0" imgH="0" progId="">
+                <p:oleObj spid="_x0000_s1897" name="think-cell Slide" r:id="rId8" imgW="0" imgH="0" progId="">
                   <p:embed/>
                 </p:oleObj>
               </mc:Choice>
@@ -1075,7 +1076,7 @@
           <a:graphicData uri="http://schemas.openxmlformats.org/presentationml/2006/ole">
             <mc:AlternateContent xmlns:mc="http://schemas.openxmlformats.org/markup-compatibility/2006">
               <mc:Choice xmlns:v="urn:schemas-microsoft-com:vml" Requires="v">
-                <p:oleObj spid="_x0000_s9060" name="think-cell Slide" r:id="rId5" imgW="0" imgH="0" progId="">
+                <p:oleObj spid="_x0000_s9064" name="think-cell Slide" r:id="rId5" imgW="0" imgH="0" progId="">
                   <p:embed/>
                 </p:oleObj>
               </mc:Choice>
@@ -1372,7 +1373,7 @@
           <a:graphicData uri="http://schemas.openxmlformats.org/presentationml/2006/ole">
             <mc:AlternateContent xmlns:mc="http://schemas.openxmlformats.org/markup-compatibility/2006">
               <mc:Choice xmlns:v="urn:schemas-microsoft-com:vml" Requires="v">
-                <p:oleObj spid="_x0000_s137061" name="think-cell Slide" r:id="rId6" imgW="0" imgH="0" progId="">
+                <p:oleObj spid="_x0000_s137065" name="think-cell Slide" r:id="rId6" imgW="0" imgH="0" progId="">
                   <p:embed/>
                 </p:oleObj>
               </mc:Choice>
@@ -1706,7 +1707,7 @@
           <a:graphicData uri="http://schemas.openxmlformats.org/presentationml/2006/ole">
             <mc:AlternateContent xmlns:mc="http://schemas.openxmlformats.org/markup-compatibility/2006">
               <mc:Choice xmlns:v="urn:schemas-microsoft-com:vml" Requires="v">
-                <p:oleObj spid="_x0000_s109413" name="think-cell Slide" r:id="rId4" imgW="0" imgH="0" progId="">
+                <p:oleObj spid="_x0000_s109417" name="think-cell Slide" r:id="rId4" imgW="0" imgH="0" progId="">
                   <p:embed/>
                 </p:oleObj>
               </mc:Choice>
@@ -1896,7 +1897,7 @@
           <a:graphicData uri="http://schemas.openxmlformats.org/presentationml/2006/ole">
             <mc:AlternateContent xmlns:mc="http://schemas.openxmlformats.org/markup-compatibility/2006">
               <mc:Choice xmlns:v="urn:schemas-microsoft-com:vml" Requires="v">
-                <p:oleObj spid="_x0000_s115557" name="think-cell Slide" r:id="rId4" imgW="0" imgH="0" progId="">
+                <p:oleObj spid="_x0000_s115561" name="think-cell Slide" r:id="rId4" imgW="0" imgH="0" progId="">
                   <p:embed/>
                 </p:oleObj>
               </mc:Choice>
@@ -2086,7 +2087,7 @@
           <a:graphicData uri="http://schemas.openxmlformats.org/presentationml/2006/ole">
             <mc:AlternateContent xmlns:mc="http://schemas.openxmlformats.org/markup-compatibility/2006">
               <mc:Choice xmlns:v="urn:schemas-microsoft-com:vml" Requires="v">
-                <p:oleObj spid="_x0000_s108389" name="think-cell Slide" r:id="rId4" imgW="0" imgH="0" progId="">
+                <p:oleObj spid="_x0000_s108393" name="think-cell Slide" r:id="rId4" imgW="0" imgH="0" progId="">
                   <p:embed/>
                 </p:oleObj>
               </mc:Choice>
@@ -2194,7 +2195,7 @@
           <a:graphicData uri="http://schemas.openxmlformats.org/presentationml/2006/ole">
             <mc:AlternateContent xmlns:mc="http://schemas.openxmlformats.org/markup-compatibility/2006">
               <mc:Choice xmlns:v="urn:schemas-microsoft-com:vml" Requires="v">
-                <p:oleObj spid="_x0000_s116581" name="think-cell Slide" r:id="rId4" imgW="0" imgH="0" progId="">
+                <p:oleObj spid="_x0000_s116585" name="think-cell Slide" r:id="rId4" imgW="0" imgH="0" progId="">
                   <p:embed/>
                 </p:oleObj>
               </mc:Choice>
@@ -2392,7 +2393,7 @@
           <a:graphicData uri="http://schemas.openxmlformats.org/presentationml/2006/ole">
             <mc:AlternateContent xmlns:mc="http://schemas.openxmlformats.org/markup-compatibility/2006">
               <mc:Choice xmlns:v="urn:schemas-microsoft-com:vml" Requires="v">
-                <p:oleObj spid="_x0000_s138085" name="think-cell Slide" r:id="rId4" imgW="0" imgH="0" progId="">
+                <p:oleObj spid="_x0000_s138089" name="think-cell Slide" r:id="rId4" imgW="0" imgH="0" progId="">
                   <p:embed/>
                 </p:oleObj>
               </mc:Choice>
@@ -2539,7 +2540,7 @@
           <a:graphicData uri="http://schemas.openxmlformats.org/presentationml/2006/ole">
             <mc:AlternateContent xmlns:mc="http://schemas.openxmlformats.org/markup-compatibility/2006">
               <mc:Choice xmlns:v="urn:schemas-microsoft-com:vml" Requires="v">
-                <p:oleObj spid="_x0000_s117605" name="think-cell Slide" r:id="rId18" imgW="0" imgH="0" progId="">
+                <p:oleObj spid="_x0000_s117609" name="think-cell Slide" r:id="rId18" imgW="0" imgH="0" progId="">
                   <p:embed/>
                 </p:oleObj>
               </mc:Choice>
@@ -3695,7 +3696,7 @@
           <a:graphicData uri="http://schemas.openxmlformats.org/presentationml/2006/ole">
             <mc:AlternateContent xmlns:mc="http://schemas.openxmlformats.org/markup-compatibility/2006">
               <mc:Choice xmlns:v="urn:schemas-microsoft-com:vml" Requires="v">
-                <p:oleObj spid="_x0000_s2919" name="think-cell Slide" r:id="rId17" imgW="0" imgH="0" progId="">
+                <p:oleObj spid="_x0000_s2923" name="think-cell Slide" r:id="rId17" imgW="0" imgH="0" progId="">
                   <p:embed/>
                 </p:oleObj>
               </mc:Choice>
@@ -7152,16 +7153,6 @@
               </a:rPr>
               <a:t>Demos</a:t>
             </a:r>
-            <a:endParaRPr kumimoji="0" lang="de-DE" sz="1400" b="0" i="0" u="none" strike="noStrike" cap="none" normalizeH="0" baseline="0" dirty="0" smtClean="0">
-              <a:ln>
-                <a:noFill/>
-              </a:ln>
-              <a:solidFill>
-                <a:schemeClr val="bg1"/>
-              </a:solidFill>
-              <a:effectLst/>
-              <a:latin typeface="+mn-lt"/>
-            </a:endParaRPr>
           </a:p>
         </p:txBody>
       </p:sp>
@@ -7548,13 +7539,7 @@
               <a:rPr lang="de-DE" dirty="0" err="1" smtClean="0">
                 <a:latin typeface="+mn-lt"/>
               </a:rPr>
-              <a:t>c</a:t>
-            </a:r>
-            <a:r>
-              <a:rPr lang="de-DE" dirty="0" err="1" smtClean="0">
-                <a:latin typeface="+mn-lt"/>
-              </a:rPr>
-              <a:t>hecklist</a:t>
+              <a:t>checklist</a:t>
             </a:r>
             <a:endParaRPr lang="de-DE" sz="1400" dirty="0" smtClean="0">
               <a:latin typeface="+mn-lt"/>
@@ -7704,9 +7689,6 @@
               </a:rPr>
               <a:t> &amp; links</a:t>
             </a:r>
-            <a:endParaRPr lang="de-DE" sz="1100" dirty="0" smtClean="0">
-              <a:latin typeface="+mn-lt"/>
-            </a:endParaRPr>
           </a:p>
         </p:txBody>
       </p:sp>
@@ -8631,16 +8613,6 @@
               </a:rPr>
               <a:t>Quickstarts</a:t>
             </a:r>
-            <a:endParaRPr kumimoji="0" lang="de-DE" sz="1200" b="0" i="0" u="none" strike="noStrike" cap="none" normalizeH="0" baseline="0" dirty="0" smtClean="0">
-              <a:ln>
-                <a:noFill/>
-              </a:ln>
-              <a:solidFill>
-                <a:schemeClr val="bg1"/>
-              </a:solidFill>
-              <a:effectLst/>
-              <a:latin typeface="+mn-lt"/>
-            </a:endParaRPr>
           </a:p>
         </p:txBody>
       </p:sp>
@@ -8714,16 +8686,6 @@
               </a:rPr>
               <a:t>Demos</a:t>
             </a:r>
-            <a:endParaRPr kumimoji="0" lang="de-DE" sz="1200" b="0" i="0" u="none" strike="noStrike" cap="none" normalizeH="0" baseline="0" dirty="0" smtClean="0">
-              <a:ln>
-                <a:noFill/>
-              </a:ln>
-              <a:solidFill>
-                <a:schemeClr val="bg1"/>
-              </a:solidFill>
-              <a:effectLst/>
-              <a:latin typeface="+mn-lt"/>
-            </a:endParaRPr>
           </a:p>
         </p:txBody>
       </p:sp>
@@ -9110,13 +9072,7 @@
               <a:rPr lang="de-DE" sz="1200" dirty="0" err="1" smtClean="0">
                 <a:latin typeface="+mn-lt"/>
               </a:rPr>
-              <a:t>c</a:t>
-            </a:r>
-            <a:r>
-              <a:rPr lang="de-DE" sz="1200" dirty="0" err="1" smtClean="0">
-                <a:latin typeface="+mn-lt"/>
-              </a:rPr>
-              <a:t>hecklists</a:t>
+              <a:t>checklists</a:t>
             </a:r>
             <a:endParaRPr lang="de-DE" sz="1400" dirty="0" smtClean="0">
               <a:latin typeface="+mn-lt"/>
@@ -9521,6 +9477,1459 @@
     <p:extLst>
       <p:ext uri="{BB962C8B-B14F-4D97-AF65-F5344CB8AC3E}">
         <p14:creationId xmlns:p14="http://schemas.microsoft.com/office/powerpoint/2010/main" val="3746200705"/>
+      </p:ext>
+    </p:extLst>
+  </p:cSld>
+  <p:clrMapOvr>
+    <a:masterClrMapping/>
+  </p:clrMapOvr>
+  <p:transition/>
+</p:sld>
+</file>
+
+<file path=ppt/slides/slide5.xml><?xml version="1.0" encoding="utf-8"?>
+<p:sld xmlns:a="http://schemas.openxmlformats.org/drawingml/2006/main" xmlns:r="http://schemas.openxmlformats.org/officeDocument/2006/relationships" xmlns:p="http://schemas.openxmlformats.org/presentationml/2006/main">
+  <p:cSld>
+    <p:spTree>
+      <p:nvGrpSpPr>
+        <p:cNvPr id="1" name=""/>
+        <p:cNvGrpSpPr/>
+        <p:nvPr/>
+      </p:nvGrpSpPr>
+      <p:grpSpPr>
+        <a:xfrm>
+          <a:off x="0" y="0"/>
+          <a:ext cx="0" cy="0"/>
+          <a:chOff x="0" y="0"/>
+          <a:chExt cx="0" cy="0"/>
+        </a:xfrm>
+      </p:grpSpPr>
+      <p:sp>
+        <p:nvSpPr>
+          <p:cNvPr id="33" name="Rechteck 32"/>
+          <p:cNvSpPr/>
+          <p:nvPr/>
+        </p:nvSpPr>
+        <p:spPr bwMode="auto">
+          <a:xfrm>
+            <a:off x="1838510" y="4392762"/>
+            <a:ext cx="3844148" cy="1306923"/>
+          </a:xfrm>
+          <a:prstGeom prst="rect">
+            <a:avLst/>
+          </a:prstGeom>
+          <a:solidFill>
+            <a:schemeClr val="accent5"/>
+          </a:solidFill>
+          <a:ln>
+            <a:noFill/>
+            <a:headEnd type="none" w="med" len="med"/>
+            <a:tailEnd type="none" w="med" len="med"/>
+          </a:ln>
+          <a:effectLst>
+            <a:outerShdw blurRad="50800" dist="38100" dir="2700000" algn="tl" rotWithShape="0">
+              <a:prstClr val="black">
+                <a:alpha val="40000"/>
+              </a:prstClr>
+            </a:outerShdw>
+          </a:effectLst>
+        </p:spPr>
+        <p:style>
+          <a:lnRef idx="1">
+            <a:schemeClr val="dk1"/>
+          </a:lnRef>
+          <a:fillRef idx="2">
+            <a:schemeClr val="dk1"/>
+          </a:fillRef>
+          <a:effectRef idx="1">
+            <a:schemeClr val="dk1"/>
+          </a:effectRef>
+          <a:fontRef idx="minor">
+            <a:schemeClr val="dk1"/>
+          </a:fontRef>
+        </p:style>
+        <p:txBody>
+          <a:bodyPr vert="horz" wrap="square" lIns="72000" tIns="46800" rIns="72000" bIns="46800" numCol="1" rtlCol="0" anchor="ctr" anchorCtr="0" compatLnSpc="1">
+            <a:prstTxWarp prst="textNoShape">
+              <a:avLst/>
+            </a:prstTxWarp>
+          </a:bodyPr>
+          <a:lstStyle/>
+          <a:p>
+            <a:pPr marL="0" marR="0" indent="0" algn="ctr" defTabSz="914400" rtl="0" eaLnBrk="1" fontAlgn="base" latinLnBrk="0" hangingPunct="1">
+              <a:lnSpc>
+                <a:spcPct val="90000"/>
+              </a:lnSpc>
+              <a:spcBef>
+                <a:spcPct val="0"/>
+              </a:spcBef>
+              <a:spcAft>
+                <a:spcPct val="0"/>
+              </a:spcAft>
+              <a:buClrTx/>
+              <a:buSzTx/>
+              <a:buFontTx/>
+              <a:buNone/>
+              <a:tabLst/>
+            </a:pPr>
+            <a:endParaRPr kumimoji="0" lang="de-DE" sz="2400" b="0" i="0" u="none" strike="noStrike" cap="none" normalizeH="0" baseline="0" smtClean="0">
+              <a:ln>
+                <a:noFill/>
+              </a:ln>
+              <a:solidFill>
+                <a:schemeClr val="tx1"/>
+              </a:solidFill>
+              <a:effectLst/>
+              <a:latin typeface="+mn-lt"/>
+            </a:endParaRPr>
+          </a:p>
+        </p:txBody>
+      </p:sp>
+      <p:sp>
+        <p:nvSpPr>
+          <p:cNvPr id="20" name="Rechteck 19"/>
+          <p:cNvSpPr/>
+          <p:nvPr/>
+        </p:nvSpPr>
+        <p:spPr bwMode="auto">
+          <a:xfrm>
+            <a:off x="244213" y="1414162"/>
+            <a:ext cx="3175659" cy="2590902"/>
+          </a:xfrm>
+          <a:prstGeom prst="rect">
+            <a:avLst/>
+          </a:prstGeom>
+          <a:solidFill>
+            <a:schemeClr val="accent5"/>
+          </a:solidFill>
+          <a:ln>
+            <a:noFill/>
+            <a:headEnd type="none" w="med" len="med"/>
+            <a:tailEnd type="none" w="med" len="med"/>
+          </a:ln>
+          <a:effectLst>
+            <a:outerShdw blurRad="50800" dist="38100" dir="2700000" algn="tl" rotWithShape="0">
+              <a:prstClr val="black">
+                <a:alpha val="40000"/>
+              </a:prstClr>
+            </a:outerShdw>
+          </a:effectLst>
+        </p:spPr>
+        <p:style>
+          <a:lnRef idx="1">
+            <a:schemeClr val="dk1"/>
+          </a:lnRef>
+          <a:fillRef idx="2">
+            <a:schemeClr val="dk1"/>
+          </a:fillRef>
+          <a:effectRef idx="1">
+            <a:schemeClr val="dk1"/>
+          </a:effectRef>
+          <a:fontRef idx="minor">
+            <a:schemeClr val="dk1"/>
+          </a:fontRef>
+        </p:style>
+        <p:txBody>
+          <a:bodyPr vert="horz" wrap="square" lIns="72000" tIns="46800" rIns="72000" bIns="46800" numCol="1" rtlCol="0" anchor="ctr" anchorCtr="0" compatLnSpc="1">
+            <a:prstTxWarp prst="textNoShape">
+              <a:avLst/>
+            </a:prstTxWarp>
+          </a:bodyPr>
+          <a:lstStyle/>
+          <a:p>
+            <a:pPr marL="0" marR="0" indent="0" algn="ctr" defTabSz="914400" rtl="0" eaLnBrk="1" fontAlgn="base" latinLnBrk="0" hangingPunct="1">
+              <a:lnSpc>
+                <a:spcPct val="90000"/>
+              </a:lnSpc>
+              <a:spcBef>
+                <a:spcPct val="0"/>
+              </a:spcBef>
+              <a:spcAft>
+                <a:spcPct val="0"/>
+              </a:spcAft>
+              <a:buClrTx/>
+              <a:buSzTx/>
+              <a:buFontTx/>
+              <a:buNone/>
+              <a:tabLst/>
+            </a:pPr>
+            <a:endParaRPr kumimoji="0" lang="de-DE" sz="2400" b="0" i="0" u="none" strike="noStrike" cap="none" normalizeH="0" baseline="0" smtClean="0">
+              <a:ln>
+                <a:noFill/>
+              </a:ln>
+              <a:solidFill>
+                <a:schemeClr val="tx1"/>
+              </a:solidFill>
+              <a:effectLst/>
+              <a:latin typeface="+mn-lt"/>
+            </a:endParaRPr>
+          </a:p>
+        </p:txBody>
+      </p:sp>
+      <p:sp>
+        <p:nvSpPr>
+          <p:cNvPr id="25" name="Rechteck 24"/>
+          <p:cNvSpPr/>
+          <p:nvPr/>
+        </p:nvSpPr>
+        <p:spPr bwMode="auto">
+          <a:xfrm>
+            <a:off x="3998209" y="1414162"/>
+            <a:ext cx="3670136" cy="2590902"/>
+          </a:xfrm>
+          <a:prstGeom prst="rect">
+            <a:avLst/>
+          </a:prstGeom>
+          <a:solidFill>
+            <a:schemeClr val="accent5"/>
+          </a:solidFill>
+          <a:ln>
+            <a:noFill/>
+            <a:headEnd type="none" w="med" len="med"/>
+            <a:tailEnd type="none" w="med" len="med"/>
+          </a:ln>
+          <a:effectLst>
+            <a:outerShdw blurRad="50800" dist="38100" dir="2700000" algn="tl" rotWithShape="0">
+              <a:prstClr val="black">
+                <a:alpha val="40000"/>
+              </a:prstClr>
+            </a:outerShdw>
+          </a:effectLst>
+        </p:spPr>
+        <p:style>
+          <a:lnRef idx="1">
+            <a:schemeClr val="dk1"/>
+          </a:lnRef>
+          <a:fillRef idx="2">
+            <a:schemeClr val="dk1"/>
+          </a:fillRef>
+          <a:effectRef idx="1">
+            <a:schemeClr val="dk1"/>
+          </a:effectRef>
+          <a:fontRef idx="minor">
+            <a:schemeClr val="dk1"/>
+          </a:fontRef>
+        </p:style>
+        <p:txBody>
+          <a:bodyPr vert="horz" wrap="square" lIns="72000" tIns="46800" rIns="72000" bIns="46800" numCol="1" rtlCol="0" anchor="ctr" anchorCtr="0" compatLnSpc="1">
+            <a:prstTxWarp prst="textNoShape">
+              <a:avLst/>
+            </a:prstTxWarp>
+          </a:bodyPr>
+          <a:lstStyle/>
+          <a:p>
+            <a:pPr marL="0" marR="0" indent="0" algn="ctr" defTabSz="914400" rtl="0" eaLnBrk="1" fontAlgn="base" latinLnBrk="0" hangingPunct="1">
+              <a:lnSpc>
+                <a:spcPct val="90000"/>
+              </a:lnSpc>
+              <a:spcBef>
+                <a:spcPct val="0"/>
+              </a:spcBef>
+              <a:spcAft>
+                <a:spcPct val="0"/>
+              </a:spcAft>
+              <a:buClrTx/>
+              <a:buSzTx/>
+              <a:buFontTx/>
+              <a:buNone/>
+              <a:tabLst/>
+            </a:pPr>
+            <a:endParaRPr kumimoji="0" lang="de-DE" sz="2400" b="0" i="0" u="none" strike="noStrike" cap="none" normalizeH="0" baseline="0" smtClean="0">
+              <a:ln>
+                <a:noFill/>
+              </a:ln>
+              <a:solidFill>
+                <a:schemeClr val="tx1"/>
+              </a:solidFill>
+              <a:effectLst/>
+              <a:latin typeface="+mn-lt"/>
+            </a:endParaRPr>
+          </a:p>
+        </p:txBody>
+      </p:sp>
+      <p:sp>
+        <p:nvSpPr>
+          <p:cNvPr id="5" name="Rechteck 4"/>
+          <p:cNvSpPr/>
+          <p:nvPr/>
+        </p:nvSpPr>
+        <p:spPr bwMode="auto">
+          <a:xfrm>
+            <a:off x="1987992" y="1512139"/>
+            <a:ext cx="1224136" cy="1008112"/>
+          </a:xfrm>
+          <a:prstGeom prst="rect">
+            <a:avLst/>
+          </a:prstGeom>
+          <a:ln>
+            <a:headEnd type="none" w="med" len="med"/>
+            <a:tailEnd type="none" w="med" len="med"/>
+          </a:ln>
+        </p:spPr>
+        <p:style>
+          <a:lnRef idx="1">
+            <a:schemeClr val="dk1"/>
+          </a:lnRef>
+          <a:fillRef idx="3">
+            <a:schemeClr val="dk1"/>
+          </a:fillRef>
+          <a:effectRef idx="2">
+            <a:schemeClr val="dk1"/>
+          </a:effectRef>
+          <a:fontRef idx="minor">
+            <a:schemeClr val="lt1"/>
+          </a:fontRef>
+        </p:style>
+        <p:txBody>
+          <a:bodyPr vert="horz" wrap="square" lIns="72000" tIns="46800" rIns="72000" bIns="46800" numCol="1" rtlCol="0" anchor="ctr" anchorCtr="0" compatLnSpc="1">
+            <a:prstTxWarp prst="textNoShape">
+              <a:avLst/>
+            </a:prstTxWarp>
+          </a:bodyPr>
+          <a:lstStyle/>
+          <a:p>
+            <a:pPr marL="0" marR="0" indent="0" algn="ctr" defTabSz="914400" rtl="0" eaLnBrk="1" fontAlgn="base" latinLnBrk="0" hangingPunct="1">
+              <a:lnSpc>
+                <a:spcPct val="90000"/>
+              </a:lnSpc>
+              <a:spcBef>
+                <a:spcPct val="0"/>
+              </a:spcBef>
+              <a:spcAft>
+                <a:spcPct val="0"/>
+              </a:spcAft>
+              <a:buClrTx/>
+              <a:buSzTx/>
+              <a:buFontTx/>
+              <a:buNone/>
+              <a:tabLst/>
+            </a:pPr>
+            <a:r>
+              <a:rPr kumimoji="0" lang="de-DE" sz="1200" b="0" i="0" u="none" strike="noStrike" cap="none" normalizeH="0" baseline="0" dirty="0" smtClean="0">
+                <a:ln>
+                  <a:noFill/>
+                </a:ln>
+                <a:solidFill>
+                  <a:schemeClr val="bg1"/>
+                </a:solidFill>
+                <a:effectLst/>
+                <a:latin typeface="+mn-lt"/>
+              </a:rPr>
+              <a:t>Modeling</a:t>
+            </a:r>
+          </a:p>
+          <a:p>
+            <a:pPr marL="0" marR="0" indent="0" algn="ctr" defTabSz="914400" rtl="0" eaLnBrk="1" fontAlgn="base" latinLnBrk="0" hangingPunct="1">
+              <a:lnSpc>
+                <a:spcPct val="90000"/>
+              </a:lnSpc>
+              <a:spcBef>
+                <a:spcPct val="0"/>
+              </a:spcBef>
+              <a:spcAft>
+                <a:spcPct val="0"/>
+              </a:spcAft>
+              <a:buClrTx/>
+              <a:buSzTx/>
+              <a:buFontTx/>
+              <a:buNone/>
+              <a:tabLst/>
+            </a:pPr>
+            <a:r>
+              <a:rPr kumimoji="0" lang="de-DE" sz="1200" b="0" i="0" u="none" strike="noStrike" cap="none" normalizeH="0" baseline="0" dirty="0" smtClean="0">
+                <a:ln>
+                  <a:noFill/>
+                </a:ln>
+                <a:solidFill>
+                  <a:schemeClr val="bg1"/>
+                </a:solidFill>
+                <a:effectLst/>
+                <a:latin typeface="+mn-lt"/>
+              </a:rPr>
+              <a:t>Guidelines</a:t>
+            </a:r>
+          </a:p>
+          <a:p>
+            <a:pPr marL="0" marR="0" indent="0" algn="ctr" defTabSz="914400" rtl="0" eaLnBrk="1" fontAlgn="base" latinLnBrk="0" hangingPunct="1">
+              <a:lnSpc>
+                <a:spcPct val="90000"/>
+              </a:lnSpc>
+              <a:spcBef>
+                <a:spcPct val="0"/>
+              </a:spcBef>
+              <a:spcAft>
+                <a:spcPct val="0"/>
+              </a:spcAft>
+              <a:buClrTx/>
+              <a:buSzTx/>
+              <a:buFontTx/>
+              <a:buNone/>
+              <a:tabLst/>
+            </a:pPr>
+            <a:r>
+              <a:rPr lang="de-DE" sz="1200" dirty="0" err="1" smtClean="0">
+                <a:solidFill>
+                  <a:schemeClr val="bg1"/>
+                </a:solidFill>
+              </a:rPr>
+              <a:t>and</a:t>
+            </a:r>
+            <a:r>
+              <a:rPr lang="de-DE" sz="1200" dirty="0" smtClean="0">
+                <a:solidFill>
+                  <a:schemeClr val="bg1"/>
+                </a:solidFill>
+              </a:rPr>
+              <a:t> Rules</a:t>
+            </a:r>
+            <a:endParaRPr kumimoji="0" lang="de-DE" sz="1200" b="0" i="0" u="none" strike="noStrike" cap="none" normalizeH="0" baseline="0" dirty="0" smtClean="0">
+              <a:ln>
+                <a:noFill/>
+              </a:ln>
+              <a:solidFill>
+                <a:schemeClr val="bg1"/>
+              </a:solidFill>
+              <a:effectLst/>
+              <a:latin typeface="+mn-lt"/>
+            </a:endParaRPr>
+          </a:p>
+        </p:txBody>
+      </p:sp>
+      <p:sp>
+        <p:nvSpPr>
+          <p:cNvPr id="6" name="Rechteck 5"/>
+          <p:cNvSpPr/>
+          <p:nvPr/>
+        </p:nvSpPr>
+        <p:spPr bwMode="auto">
+          <a:xfrm>
+            <a:off x="1987992" y="2708920"/>
+            <a:ext cx="1224136" cy="1008112"/>
+          </a:xfrm>
+          <a:prstGeom prst="rect">
+            <a:avLst/>
+          </a:prstGeom>
+          <a:ln>
+            <a:headEnd type="none" w="med" len="med"/>
+            <a:tailEnd type="none" w="med" len="med"/>
+          </a:ln>
+        </p:spPr>
+        <p:style>
+          <a:lnRef idx="1">
+            <a:schemeClr val="dk1"/>
+          </a:lnRef>
+          <a:fillRef idx="3">
+            <a:schemeClr val="dk1"/>
+          </a:fillRef>
+          <a:effectRef idx="2">
+            <a:schemeClr val="dk1"/>
+          </a:effectRef>
+          <a:fontRef idx="minor">
+            <a:schemeClr val="lt1"/>
+          </a:fontRef>
+        </p:style>
+        <p:txBody>
+          <a:bodyPr vert="horz" wrap="square" lIns="72000" tIns="46800" rIns="72000" bIns="46800" numCol="1" rtlCol="0" anchor="ctr" anchorCtr="0" compatLnSpc="1">
+            <a:prstTxWarp prst="textNoShape">
+              <a:avLst/>
+            </a:prstTxWarp>
+          </a:bodyPr>
+          <a:lstStyle/>
+          <a:p>
+            <a:pPr marL="0" marR="0" indent="0" algn="ctr" defTabSz="914400" rtl="0" eaLnBrk="1" fontAlgn="base" latinLnBrk="0" hangingPunct="1">
+              <a:lnSpc>
+                <a:spcPct val="90000"/>
+              </a:lnSpc>
+              <a:spcBef>
+                <a:spcPct val="0"/>
+              </a:spcBef>
+              <a:spcAft>
+                <a:spcPct val="0"/>
+              </a:spcAft>
+              <a:buClrTx/>
+              <a:buSzTx/>
+              <a:buFontTx/>
+              <a:buNone/>
+              <a:tabLst/>
+            </a:pPr>
+            <a:r>
+              <a:rPr lang="de-DE" sz="1200" dirty="0" smtClean="0">
+                <a:solidFill>
+                  <a:schemeClr val="bg1"/>
+                </a:solidFill>
+                <a:latin typeface="+mn-lt"/>
+              </a:rPr>
+              <a:t>Modeling</a:t>
+            </a:r>
+          </a:p>
+          <a:p>
+            <a:pPr marL="0" marR="0" indent="0" algn="ctr" defTabSz="914400" rtl="0" eaLnBrk="1" fontAlgn="base" latinLnBrk="0" hangingPunct="1">
+              <a:lnSpc>
+                <a:spcPct val="90000"/>
+              </a:lnSpc>
+              <a:spcBef>
+                <a:spcPct val="0"/>
+              </a:spcBef>
+              <a:spcAft>
+                <a:spcPct val="0"/>
+              </a:spcAft>
+              <a:buClrTx/>
+              <a:buSzTx/>
+              <a:buFontTx/>
+              <a:buNone/>
+              <a:tabLst/>
+            </a:pPr>
+            <a:r>
+              <a:rPr lang="de-DE" sz="1200" dirty="0" smtClean="0">
+                <a:solidFill>
+                  <a:schemeClr val="bg1"/>
+                </a:solidFill>
+                <a:latin typeface="+mn-lt"/>
+              </a:rPr>
+              <a:t>Patterns</a:t>
+            </a:r>
+            <a:endParaRPr kumimoji="0" lang="de-DE" sz="1200" b="0" i="0" u="none" strike="noStrike" cap="none" normalizeH="0" baseline="0" dirty="0" smtClean="0">
+              <a:ln>
+                <a:noFill/>
+              </a:ln>
+              <a:solidFill>
+                <a:schemeClr val="bg1"/>
+              </a:solidFill>
+              <a:effectLst/>
+              <a:latin typeface="+mn-lt"/>
+            </a:endParaRPr>
+          </a:p>
+        </p:txBody>
+      </p:sp>
+      <p:sp>
+        <p:nvSpPr>
+          <p:cNvPr id="7" name="Rechteck 6"/>
+          <p:cNvSpPr/>
+          <p:nvPr/>
+        </p:nvSpPr>
+        <p:spPr bwMode="auto">
+          <a:xfrm>
+            <a:off x="4249886" y="1512139"/>
+            <a:ext cx="1224136" cy="1008112"/>
+          </a:xfrm>
+          <a:prstGeom prst="rect">
+            <a:avLst/>
+          </a:prstGeom>
+          <a:ln>
+            <a:headEnd type="none" w="med" len="med"/>
+            <a:tailEnd type="none" w="med" len="med"/>
+          </a:ln>
+        </p:spPr>
+        <p:style>
+          <a:lnRef idx="1">
+            <a:schemeClr val="dk1"/>
+          </a:lnRef>
+          <a:fillRef idx="3">
+            <a:schemeClr val="dk1"/>
+          </a:fillRef>
+          <a:effectRef idx="2">
+            <a:schemeClr val="dk1"/>
+          </a:effectRef>
+          <a:fontRef idx="minor">
+            <a:schemeClr val="lt1"/>
+          </a:fontRef>
+        </p:style>
+        <p:txBody>
+          <a:bodyPr vert="horz" wrap="square" lIns="72000" tIns="46800" rIns="72000" bIns="46800" numCol="1" rtlCol="0" anchor="ctr" anchorCtr="0" compatLnSpc="1">
+            <a:prstTxWarp prst="textNoShape">
+              <a:avLst/>
+            </a:prstTxWarp>
+          </a:bodyPr>
+          <a:lstStyle/>
+          <a:p>
+            <a:pPr marL="0" marR="0" indent="0" algn="ctr" defTabSz="914400" rtl="0" eaLnBrk="1" fontAlgn="base" latinLnBrk="0" hangingPunct="1">
+              <a:lnSpc>
+                <a:spcPct val="90000"/>
+              </a:lnSpc>
+              <a:spcBef>
+                <a:spcPct val="0"/>
+              </a:spcBef>
+              <a:spcAft>
+                <a:spcPct val="0"/>
+              </a:spcAft>
+              <a:buClrTx/>
+              <a:buSzTx/>
+              <a:buFontTx/>
+              <a:buNone/>
+              <a:tabLst/>
+            </a:pPr>
+            <a:r>
+              <a:rPr kumimoji="0" lang="de-DE" sz="1200" b="0" i="0" u="none" strike="noStrike" cap="none" normalizeH="0" baseline="0" dirty="0" err="1" smtClean="0">
+                <a:ln>
+                  <a:noFill/>
+                </a:ln>
+                <a:solidFill>
+                  <a:schemeClr val="bg1"/>
+                </a:solidFill>
+                <a:effectLst/>
+                <a:latin typeface="+mn-lt"/>
+              </a:rPr>
+              <a:t>Tutorials</a:t>
+            </a:r>
+            <a:endParaRPr kumimoji="0" lang="de-DE" sz="1200" b="0" i="0" u="none" strike="noStrike" cap="none" normalizeH="0" baseline="0" dirty="0" smtClean="0">
+              <a:ln>
+                <a:noFill/>
+              </a:ln>
+              <a:solidFill>
+                <a:schemeClr val="bg1"/>
+              </a:solidFill>
+              <a:effectLst/>
+              <a:latin typeface="+mn-lt"/>
+            </a:endParaRPr>
+          </a:p>
+        </p:txBody>
+      </p:sp>
+      <p:sp>
+        <p:nvSpPr>
+          <p:cNvPr id="8" name="Rechteck 7"/>
+          <p:cNvSpPr/>
+          <p:nvPr/>
+        </p:nvSpPr>
+        <p:spPr bwMode="auto">
+          <a:xfrm>
+            <a:off x="5292080" y="2787830"/>
+            <a:ext cx="1224136" cy="1008112"/>
+          </a:xfrm>
+          <a:prstGeom prst="rect">
+            <a:avLst/>
+          </a:prstGeom>
+          <a:ln>
+            <a:headEnd type="none" w="med" len="med"/>
+            <a:tailEnd type="none" w="med" len="med"/>
+          </a:ln>
+        </p:spPr>
+        <p:style>
+          <a:lnRef idx="1">
+            <a:schemeClr val="dk1"/>
+          </a:lnRef>
+          <a:fillRef idx="3">
+            <a:schemeClr val="dk1"/>
+          </a:fillRef>
+          <a:effectRef idx="2">
+            <a:schemeClr val="dk1"/>
+          </a:effectRef>
+          <a:fontRef idx="minor">
+            <a:schemeClr val="lt1"/>
+          </a:fontRef>
+        </p:style>
+        <p:txBody>
+          <a:bodyPr vert="horz" wrap="square" lIns="72000" tIns="46800" rIns="72000" bIns="46800" numCol="1" rtlCol="0" anchor="ctr" anchorCtr="0" compatLnSpc="1">
+            <a:prstTxWarp prst="textNoShape">
+              <a:avLst/>
+            </a:prstTxWarp>
+          </a:bodyPr>
+          <a:lstStyle/>
+          <a:p>
+            <a:pPr marL="0" marR="0" indent="0" algn="ctr" defTabSz="914400" rtl="0" eaLnBrk="1" fontAlgn="base" latinLnBrk="0" hangingPunct="1">
+              <a:lnSpc>
+                <a:spcPct val="90000"/>
+              </a:lnSpc>
+              <a:spcBef>
+                <a:spcPct val="0"/>
+              </a:spcBef>
+              <a:spcAft>
+                <a:spcPct val="0"/>
+              </a:spcAft>
+              <a:buClrTx/>
+              <a:buSzTx/>
+              <a:buFontTx/>
+              <a:buNone/>
+              <a:tabLst/>
+            </a:pPr>
+            <a:r>
+              <a:rPr kumimoji="0" lang="de-DE" sz="1200" b="0" i="0" u="none" strike="noStrike" cap="none" normalizeH="0" baseline="0" dirty="0" smtClean="0">
+                <a:ln>
+                  <a:noFill/>
+                </a:ln>
+                <a:solidFill>
+                  <a:schemeClr val="bg1"/>
+                </a:solidFill>
+                <a:effectLst/>
+                <a:latin typeface="+mn-lt"/>
+              </a:rPr>
+              <a:t>Quickstarts</a:t>
+            </a:r>
+          </a:p>
+        </p:txBody>
+      </p:sp>
+      <p:sp>
+        <p:nvSpPr>
+          <p:cNvPr id="9" name="Rechteck 8"/>
+          <p:cNvSpPr/>
+          <p:nvPr/>
+        </p:nvSpPr>
+        <p:spPr bwMode="auto">
+          <a:xfrm>
+            <a:off x="6156176" y="1512139"/>
+            <a:ext cx="1224136" cy="1008112"/>
+          </a:xfrm>
+          <a:prstGeom prst="rect">
+            <a:avLst/>
+          </a:prstGeom>
+          <a:ln>
+            <a:headEnd type="none" w="med" len="med"/>
+            <a:tailEnd type="none" w="med" len="med"/>
+          </a:ln>
+        </p:spPr>
+        <p:style>
+          <a:lnRef idx="1">
+            <a:schemeClr val="dk1"/>
+          </a:lnRef>
+          <a:fillRef idx="3">
+            <a:schemeClr val="dk1"/>
+          </a:fillRef>
+          <a:effectRef idx="2">
+            <a:schemeClr val="dk1"/>
+          </a:effectRef>
+          <a:fontRef idx="minor">
+            <a:schemeClr val="lt1"/>
+          </a:fontRef>
+        </p:style>
+        <p:txBody>
+          <a:bodyPr vert="horz" wrap="square" lIns="72000" tIns="46800" rIns="72000" bIns="46800" numCol="1" rtlCol="0" anchor="ctr" anchorCtr="0" compatLnSpc="1">
+            <a:prstTxWarp prst="textNoShape">
+              <a:avLst/>
+            </a:prstTxWarp>
+          </a:bodyPr>
+          <a:lstStyle/>
+          <a:p>
+            <a:pPr marL="0" marR="0" indent="0" algn="ctr" defTabSz="914400" rtl="0" eaLnBrk="1" fontAlgn="base" latinLnBrk="0" hangingPunct="1">
+              <a:lnSpc>
+                <a:spcPct val="90000"/>
+              </a:lnSpc>
+              <a:spcBef>
+                <a:spcPct val="0"/>
+              </a:spcBef>
+              <a:spcAft>
+                <a:spcPct val="0"/>
+              </a:spcAft>
+              <a:buClrTx/>
+              <a:buSzTx/>
+              <a:buFontTx/>
+              <a:buNone/>
+              <a:tabLst/>
+            </a:pPr>
+            <a:r>
+              <a:rPr kumimoji="0" lang="de-DE" sz="1200" b="0" i="0" u="none" strike="noStrike" cap="none" normalizeH="0" baseline="0" dirty="0" smtClean="0">
+                <a:ln>
+                  <a:noFill/>
+                </a:ln>
+                <a:solidFill>
+                  <a:schemeClr val="bg1"/>
+                </a:solidFill>
+                <a:effectLst/>
+                <a:latin typeface="+mn-lt"/>
+              </a:rPr>
+              <a:t>Demos</a:t>
+            </a:r>
+          </a:p>
+        </p:txBody>
+      </p:sp>
+      <p:sp>
+        <p:nvSpPr>
+          <p:cNvPr id="10" name="Rechteck 9"/>
+          <p:cNvSpPr/>
+          <p:nvPr/>
+        </p:nvSpPr>
+        <p:spPr bwMode="auto">
+          <a:xfrm>
+            <a:off x="4249886" y="4566745"/>
+            <a:ext cx="1224136" cy="1008112"/>
+          </a:xfrm>
+          <a:prstGeom prst="rect">
+            <a:avLst/>
+          </a:prstGeom>
+          <a:ln>
+            <a:headEnd type="none" w="med" len="med"/>
+            <a:tailEnd type="none" w="med" len="med"/>
+          </a:ln>
+        </p:spPr>
+        <p:style>
+          <a:lnRef idx="1">
+            <a:schemeClr val="dk1"/>
+          </a:lnRef>
+          <a:fillRef idx="3">
+            <a:schemeClr val="dk1"/>
+          </a:fillRef>
+          <a:effectRef idx="2">
+            <a:schemeClr val="dk1"/>
+          </a:effectRef>
+          <a:fontRef idx="minor">
+            <a:schemeClr val="lt1"/>
+          </a:fontRef>
+        </p:style>
+        <p:txBody>
+          <a:bodyPr vert="horz" wrap="square" lIns="72000" tIns="46800" rIns="72000" bIns="46800" numCol="1" rtlCol="0" anchor="ctr" anchorCtr="0" compatLnSpc="1">
+            <a:prstTxWarp prst="textNoShape">
+              <a:avLst/>
+            </a:prstTxWarp>
+          </a:bodyPr>
+          <a:lstStyle/>
+          <a:p>
+            <a:pPr algn="ctr"/>
+            <a:r>
+              <a:rPr lang="de-DE" sz="1200" dirty="0" err="1" smtClean="0">
+                <a:solidFill>
+                  <a:schemeClr val="bg1"/>
+                </a:solidFill>
+              </a:rPr>
+              <a:t>Architecture</a:t>
+            </a:r>
+            <a:r>
+              <a:rPr lang="de-DE" sz="1200" dirty="0">
+                <a:solidFill>
+                  <a:schemeClr val="bg1"/>
+                </a:solidFill>
+              </a:rPr>
+              <a:t> </a:t>
+            </a:r>
+            <a:r>
+              <a:rPr lang="de-DE" sz="1200" dirty="0" err="1" smtClean="0">
+                <a:solidFill>
+                  <a:schemeClr val="bg1"/>
+                </a:solidFill>
+              </a:rPr>
+              <a:t>Blueprints</a:t>
+            </a:r>
+            <a:endParaRPr lang="de-DE" sz="1200" dirty="0">
+              <a:solidFill>
+                <a:schemeClr val="bg1"/>
+              </a:solidFill>
+            </a:endParaRPr>
+          </a:p>
+        </p:txBody>
+      </p:sp>
+      <p:sp>
+        <p:nvSpPr>
+          <p:cNvPr id="11" name="Rechteck 10"/>
+          <p:cNvSpPr/>
+          <p:nvPr/>
+        </p:nvSpPr>
+        <p:spPr bwMode="auto">
+          <a:xfrm>
+            <a:off x="1987992" y="4542168"/>
+            <a:ext cx="1224136" cy="1008112"/>
+          </a:xfrm>
+          <a:prstGeom prst="rect">
+            <a:avLst/>
+          </a:prstGeom>
+          <a:ln>
+            <a:headEnd type="none" w="med" len="med"/>
+            <a:tailEnd type="none" w="med" len="med"/>
+          </a:ln>
+        </p:spPr>
+        <p:style>
+          <a:lnRef idx="1">
+            <a:schemeClr val="dk1"/>
+          </a:lnRef>
+          <a:fillRef idx="3">
+            <a:schemeClr val="dk1"/>
+          </a:fillRef>
+          <a:effectRef idx="2">
+            <a:schemeClr val="dk1"/>
+          </a:effectRef>
+          <a:fontRef idx="minor">
+            <a:schemeClr val="lt1"/>
+          </a:fontRef>
+        </p:style>
+        <p:txBody>
+          <a:bodyPr vert="horz" wrap="square" lIns="72000" tIns="46800" rIns="72000" bIns="46800" numCol="1" rtlCol="0" anchor="ctr" anchorCtr="0" compatLnSpc="1">
+            <a:prstTxWarp prst="textNoShape">
+              <a:avLst/>
+            </a:prstTxWarp>
+          </a:bodyPr>
+          <a:lstStyle/>
+          <a:p>
+            <a:pPr marL="0" marR="0" indent="0" algn="ctr" defTabSz="914400" rtl="0" eaLnBrk="1" fontAlgn="base" latinLnBrk="0" hangingPunct="1">
+              <a:lnSpc>
+                <a:spcPct val="90000"/>
+              </a:lnSpc>
+              <a:spcBef>
+                <a:spcPct val="0"/>
+              </a:spcBef>
+              <a:spcAft>
+                <a:spcPct val="0"/>
+              </a:spcAft>
+              <a:buClrTx/>
+              <a:buSzTx/>
+              <a:buFontTx/>
+              <a:buNone/>
+              <a:tabLst/>
+            </a:pPr>
+            <a:r>
+              <a:rPr lang="de-DE" sz="1200" dirty="0" err="1" smtClean="0">
+                <a:solidFill>
+                  <a:schemeClr val="bg1"/>
+                </a:solidFill>
+                <a:latin typeface="+mn-lt"/>
+              </a:rPr>
+              <a:t>Success</a:t>
+            </a:r>
+            <a:r>
+              <a:rPr lang="de-DE" sz="1200" dirty="0" smtClean="0">
+                <a:solidFill>
+                  <a:schemeClr val="bg1"/>
+                </a:solidFill>
+                <a:latin typeface="+mn-lt"/>
+              </a:rPr>
+              <a:t> Stories</a:t>
+            </a:r>
+            <a:endParaRPr kumimoji="0" lang="de-DE" sz="1200" b="0" i="0" u="none" strike="noStrike" cap="none" normalizeH="0" baseline="0" dirty="0" smtClean="0">
+              <a:ln>
+                <a:noFill/>
+              </a:ln>
+              <a:solidFill>
+                <a:schemeClr val="bg1"/>
+              </a:solidFill>
+              <a:effectLst/>
+              <a:latin typeface="+mn-lt"/>
+            </a:endParaRPr>
+          </a:p>
+        </p:txBody>
+      </p:sp>
+      <p:pic>
+        <p:nvPicPr>
+          <p:cNvPr id="18" name="Picture 2" descr="C:\01 GIT\camunda-org\app\assets\img\design_land.png"/>
+          <p:cNvPicPr>
+            <a:picLocks noChangeAspect="1" noChangeArrowheads="1"/>
+          </p:cNvPicPr>
+          <p:nvPr/>
+        </p:nvPicPr>
+        <p:blipFill rotWithShape="1">
+          <a:blip r:embed="rId2">
+            <a:extLst>
+              <a:ext uri="{28A0092B-C50C-407E-A947-70E740481C1C}">
+                <a14:useLocalDpi xmlns:a14="http://schemas.microsoft.com/office/drawing/2010/main" val="0"/>
+              </a:ext>
+            </a:extLst>
+          </a:blip>
+          <a:srcRect r="81377" b="9908"/>
+          <a:stretch/>
+        </p:blipFill>
+        <p:spPr bwMode="auto">
+          <a:xfrm>
+            <a:off x="553188" y="2822358"/>
+            <a:ext cx="992372" cy="3196057"/>
+          </a:xfrm>
+          <a:prstGeom prst="rect">
+            <a:avLst/>
+          </a:prstGeom>
+          <a:noFill/>
+          <a:extLst>
+            <a:ext uri="{909E8E84-426E-40DD-AFC4-6F175D3DCCD1}">
+              <a14:hiddenFill xmlns:a14="http://schemas.microsoft.com/office/drawing/2010/main">
+                <a:solidFill>
+                  <a:srgbClr val="FFFFFF"/>
+                </a:solidFill>
+              </a14:hiddenFill>
+            </a:ext>
+          </a:extLst>
+        </p:spPr>
+      </p:pic>
+      <p:pic>
+        <p:nvPicPr>
+          <p:cNvPr id="19" name="Picture 2" descr="C:\01 GIT\camunda-org\app\assets\img\design_land.png"/>
+          <p:cNvPicPr>
+            <a:picLocks noChangeAspect="1" noChangeArrowheads="1"/>
+          </p:cNvPicPr>
+          <p:nvPr/>
+        </p:nvPicPr>
+        <p:blipFill rotWithShape="1">
+          <a:blip r:embed="rId2">
+            <a:extLst>
+              <a:ext uri="{28A0092B-C50C-407E-A947-70E740481C1C}">
+                <a14:useLocalDpi xmlns:a14="http://schemas.microsoft.com/office/drawing/2010/main" val="0"/>
+              </a:ext>
+            </a:extLst>
+          </a:blip>
+          <a:srcRect l="83096" b="11648"/>
+          <a:stretch/>
+        </p:blipFill>
+        <p:spPr bwMode="auto">
+          <a:xfrm>
+            <a:off x="6755209" y="2415972"/>
+            <a:ext cx="900734" cy="3134308"/>
+          </a:xfrm>
+          <a:prstGeom prst="rect">
+            <a:avLst/>
+          </a:prstGeom>
+          <a:noFill/>
+          <a:extLst>
+            <a:ext uri="{909E8E84-426E-40DD-AFC4-6F175D3DCCD1}">
+              <a14:hiddenFill xmlns:a14="http://schemas.microsoft.com/office/drawing/2010/main">
+                <a:solidFill>
+                  <a:srgbClr val="FFFFFF"/>
+                </a:solidFill>
+              </a14:hiddenFill>
+            </a:ext>
+          </a:extLst>
+        </p:spPr>
+      </p:pic>
+      <p:sp>
+        <p:nvSpPr>
+          <p:cNvPr id="22" name="Textfeld 21"/>
+          <p:cNvSpPr txBox="1"/>
+          <p:nvPr/>
+        </p:nvSpPr>
+        <p:spPr>
+          <a:xfrm>
+            <a:off x="1333864" y="384144"/>
+            <a:ext cx="2118843" cy="258532"/>
+          </a:xfrm>
+          <a:prstGeom prst="rect">
+            <a:avLst/>
+          </a:prstGeom>
+          <a:noFill/>
+        </p:spPr>
+        <p:txBody>
+          <a:bodyPr wrap="square" lIns="72000" rIns="72000" rtlCol="0">
+            <a:spAutoFit/>
+          </a:bodyPr>
+          <a:lstStyle/>
+          <a:p>
+            <a:r>
+              <a:rPr lang="de-DE" sz="1200" dirty="0" err="1" smtClean="0">
+                <a:latin typeface="+mn-lt"/>
+              </a:rPr>
+              <a:t>C</a:t>
+            </a:r>
+            <a:r>
+              <a:rPr lang="de-DE" sz="1200" dirty="0" err="1" smtClean="0">
+                <a:latin typeface="+mn-lt"/>
+              </a:rPr>
+              <a:t>hecklists</a:t>
+            </a:r>
+            <a:endParaRPr lang="de-DE" sz="1200" dirty="0" smtClean="0">
+              <a:latin typeface="+mn-lt"/>
+            </a:endParaRPr>
+          </a:p>
+        </p:txBody>
+      </p:sp>
+      <p:pic>
+        <p:nvPicPr>
+          <p:cNvPr id="24" name="Grafik 23"/>
+          <p:cNvPicPr>
+            <a:picLocks noChangeAspect="1"/>
+          </p:cNvPicPr>
+          <p:nvPr/>
+        </p:nvPicPr>
+        <p:blipFill>
+          <a:blip r:embed="rId3">
+            <a:extLst>
+              <a:ext uri="{28A0092B-C50C-407E-A947-70E740481C1C}">
+                <a14:useLocalDpi xmlns:a14="http://schemas.microsoft.com/office/drawing/2010/main" val="0"/>
+              </a:ext>
+            </a:extLst>
+          </a:blip>
+          <a:stretch>
+            <a:fillRect/>
+          </a:stretch>
+        </p:blipFill>
+        <p:spPr>
+          <a:xfrm>
+            <a:off x="457465" y="231356"/>
+            <a:ext cx="790575" cy="1028700"/>
+          </a:xfrm>
+          <a:prstGeom prst="rect">
+            <a:avLst/>
+          </a:prstGeom>
+        </p:spPr>
+      </p:pic>
+      <p:sp>
+        <p:nvSpPr>
+          <p:cNvPr id="26" name="Pfeil nach links und rechts 25"/>
+          <p:cNvSpPr/>
+          <p:nvPr/>
+        </p:nvSpPr>
+        <p:spPr bwMode="auto">
+          <a:xfrm>
+            <a:off x="3482211" y="4937011"/>
+            <a:ext cx="515997" cy="267579"/>
+          </a:xfrm>
+          <a:prstGeom prst="leftRightArrow">
+            <a:avLst/>
+          </a:prstGeom>
+          <a:noFill/>
+          <a:ln>
+            <a:headEnd type="none" w="med" len="med"/>
+            <a:tailEnd type="none" w="med" len="med"/>
+          </a:ln>
+        </p:spPr>
+        <p:style>
+          <a:lnRef idx="2">
+            <a:schemeClr val="dk1"/>
+          </a:lnRef>
+          <a:fillRef idx="1">
+            <a:schemeClr val="lt1"/>
+          </a:fillRef>
+          <a:effectRef idx="0">
+            <a:schemeClr val="dk1"/>
+          </a:effectRef>
+          <a:fontRef idx="minor">
+            <a:schemeClr val="dk1"/>
+          </a:fontRef>
+        </p:style>
+        <p:txBody>
+          <a:bodyPr vert="horz" wrap="square" lIns="72000" tIns="46800" rIns="72000" bIns="46800" numCol="1" rtlCol="0" anchor="ctr" anchorCtr="0" compatLnSpc="1">
+            <a:prstTxWarp prst="textNoShape">
+              <a:avLst/>
+            </a:prstTxWarp>
+          </a:bodyPr>
+          <a:lstStyle/>
+          <a:p>
+            <a:pPr algn="ctr"/>
+            <a:endParaRPr lang="de-DE" sz="500">
+              <a:latin typeface="+mn-lt"/>
+            </a:endParaRPr>
+          </a:p>
+        </p:txBody>
+      </p:sp>
+      <p:sp>
+        <p:nvSpPr>
+          <p:cNvPr id="34" name="Pfeil nach links und rechts 33"/>
+          <p:cNvSpPr/>
+          <p:nvPr/>
+        </p:nvSpPr>
+        <p:spPr bwMode="auto">
+          <a:xfrm>
+            <a:off x="3452707" y="2464245"/>
+            <a:ext cx="515997" cy="267579"/>
+          </a:xfrm>
+          <a:prstGeom prst="leftRightArrow">
+            <a:avLst/>
+          </a:prstGeom>
+          <a:noFill/>
+          <a:ln>
+            <a:headEnd type="none" w="med" len="med"/>
+            <a:tailEnd type="none" w="med" len="med"/>
+          </a:ln>
+        </p:spPr>
+        <p:style>
+          <a:lnRef idx="2">
+            <a:schemeClr val="dk1"/>
+          </a:lnRef>
+          <a:fillRef idx="1">
+            <a:schemeClr val="lt1"/>
+          </a:fillRef>
+          <a:effectRef idx="0">
+            <a:schemeClr val="dk1"/>
+          </a:effectRef>
+          <a:fontRef idx="minor">
+            <a:schemeClr val="dk1"/>
+          </a:fontRef>
+        </p:style>
+        <p:txBody>
+          <a:bodyPr vert="horz" wrap="square" lIns="72000" tIns="46800" rIns="72000" bIns="46800" numCol="1" rtlCol="0" anchor="ctr" anchorCtr="0" compatLnSpc="1">
+            <a:prstTxWarp prst="textNoShape">
+              <a:avLst/>
+            </a:prstTxWarp>
+          </a:bodyPr>
+          <a:lstStyle/>
+          <a:p>
+            <a:pPr algn="ctr"/>
+            <a:endParaRPr lang="de-DE" sz="500">
+              <a:latin typeface="+mn-lt"/>
+            </a:endParaRPr>
+          </a:p>
+        </p:txBody>
+      </p:sp>
+      <p:sp>
+        <p:nvSpPr>
+          <p:cNvPr id="35" name="Pfeil nach links und rechts 34"/>
+          <p:cNvSpPr/>
+          <p:nvPr/>
+        </p:nvSpPr>
+        <p:spPr bwMode="auto">
+          <a:xfrm>
+            <a:off x="5513577" y="1928233"/>
+            <a:ext cx="515997" cy="267579"/>
+          </a:xfrm>
+          <a:prstGeom prst="leftRightArrow">
+            <a:avLst/>
+          </a:prstGeom>
+          <a:noFill/>
+          <a:ln>
+            <a:headEnd type="none" w="med" len="med"/>
+            <a:tailEnd type="none" w="med" len="med"/>
+          </a:ln>
+        </p:spPr>
+        <p:style>
+          <a:lnRef idx="2">
+            <a:schemeClr val="dk1"/>
+          </a:lnRef>
+          <a:fillRef idx="1">
+            <a:schemeClr val="lt1"/>
+          </a:fillRef>
+          <a:effectRef idx="0">
+            <a:schemeClr val="dk1"/>
+          </a:effectRef>
+          <a:fontRef idx="minor">
+            <a:schemeClr val="dk1"/>
+          </a:fontRef>
+        </p:style>
+        <p:txBody>
+          <a:bodyPr vert="horz" wrap="square" lIns="72000" tIns="46800" rIns="72000" bIns="46800" numCol="1" rtlCol="0" anchor="ctr" anchorCtr="0" compatLnSpc="1">
+            <a:prstTxWarp prst="textNoShape">
+              <a:avLst/>
+            </a:prstTxWarp>
+          </a:bodyPr>
+          <a:lstStyle/>
+          <a:p>
+            <a:pPr algn="ctr"/>
+            <a:endParaRPr lang="de-DE" sz="500">
+              <a:latin typeface="+mn-lt"/>
+            </a:endParaRPr>
+          </a:p>
+        </p:txBody>
+      </p:sp>
+      <p:sp>
+        <p:nvSpPr>
+          <p:cNvPr id="36" name="Pfeil nach links und rechts 35"/>
+          <p:cNvSpPr/>
+          <p:nvPr/>
+        </p:nvSpPr>
+        <p:spPr bwMode="auto">
+          <a:xfrm rot="2853308">
+            <a:off x="4761236" y="2675960"/>
+            <a:ext cx="515997" cy="267579"/>
+          </a:xfrm>
+          <a:prstGeom prst="leftRightArrow">
+            <a:avLst/>
+          </a:prstGeom>
+          <a:noFill/>
+          <a:ln>
+            <a:headEnd type="none" w="med" len="med"/>
+            <a:tailEnd type="none" w="med" len="med"/>
+          </a:ln>
+        </p:spPr>
+        <p:style>
+          <a:lnRef idx="2">
+            <a:schemeClr val="dk1"/>
+          </a:lnRef>
+          <a:fillRef idx="1">
+            <a:schemeClr val="lt1"/>
+          </a:fillRef>
+          <a:effectRef idx="0">
+            <a:schemeClr val="dk1"/>
+          </a:effectRef>
+          <a:fontRef idx="minor">
+            <a:schemeClr val="dk1"/>
+          </a:fontRef>
+        </p:style>
+        <p:txBody>
+          <a:bodyPr vert="horz" wrap="square" lIns="72000" tIns="46800" rIns="72000" bIns="46800" numCol="1" rtlCol="0" anchor="ctr" anchorCtr="0" compatLnSpc="1">
+            <a:prstTxWarp prst="textNoShape">
+              <a:avLst/>
+            </a:prstTxWarp>
+          </a:bodyPr>
+          <a:lstStyle/>
+          <a:p>
+            <a:pPr algn="ctr"/>
+            <a:endParaRPr lang="de-DE" sz="500">
+              <a:latin typeface="+mn-lt"/>
+            </a:endParaRPr>
+          </a:p>
+        </p:txBody>
+      </p:sp>
+      <p:sp>
+        <p:nvSpPr>
+          <p:cNvPr id="29" name="Rechteck 28"/>
+          <p:cNvSpPr/>
+          <p:nvPr/>
+        </p:nvSpPr>
+        <p:spPr bwMode="auto">
+          <a:xfrm>
+            <a:off x="437306" y="1520961"/>
+            <a:ext cx="1224136" cy="1008112"/>
+          </a:xfrm>
+          <a:prstGeom prst="rect">
+            <a:avLst/>
+          </a:prstGeom>
+          <a:ln>
+            <a:headEnd type="none" w="med" len="med"/>
+            <a:tailEnd type="none" w="med" len="med"/>
+          </a:ln>
+        </p:spPr>
+        <p:style>
+          <a:lnRef idx="1">
+            <a:schemeClr val="dk1"/>
+          </a:lnRef>
+          <a:fillRef idx="3">
+            <a:schemeClr val="dk1"/>
+          </a:fillRef>
+          <a:effectRef idx="2">
+            <a:schemeClr val="dk1"/>
+          </a:effectRef>
+          <a:fontRef idx="minor">
+            <a:schemeClr val="lt1"/>
+          </a:fontRef>
+        </p:style>
+        <p:txBody>
+          <a:bodyPr vert="horz" wrap="square" lIns="72000" tIns="46800" rIns="72000" bIns="46800" numCol="1" rtlCol="0" anchor="ctr" anchorCtr="0" compatLnSpc="1">
+            <a:prstTxWarp prst="textNoShape">
+              <a:avLst/>
+            </a:prstTxWarp>
+          </a:bodyPr>
+          <a:lstStyle/>
+          <a:p>
+            <a:pPr algn="ctr"/>
+            <a:r>
+              <a:rPr lang="de-DE" sz="1200" dirty="0">
+                <a:solidFill>
+                  <a:schemeClr val="bg1"/>
+                </a:solidFill>
+              </a:rPr>
+              <a:t>BPMN 2.0 </a:t>
+            </a:r>
+            <a:r>
+              <a:rPr lang="de-DE" sz="1200" dirty="0" err="1">
+                <a:solidFill>
+                  <a:schemeClr val="bg1"/>
+                </a:solidFill>
+              </a:rPr>
+              <a:t>Methodology</a:t>
+            </a:r>
+            <a:endParaRPr lang="de-DE" sz="1200" dirty="0">
+              <a:solidFill>
+                <a:schemeClr val="bg1"/>
+              </a:solidFill>
+            </a:endParaRPr>
+          </a:p>
+        </p:txBody>
+      </p:sp>
+      <p:sp>
+        <p:nvSpPr>
+          <p:cNvPr id="31" name="Rechteck 30"/>
+          <p:cNvSpPr/>
+          <p:nvPr/>
+        </p:nvSpPr>
+        <p:spPr bwMode="auto">
+          <a:xfrm>
+            <a:off x="4249886" y="5730303"/>
+            <a:ext cx="1224136" cy="1008112"/>
+          </a:xfrm>
+          <a:prstGeom prst="rect">
+            <a:avLst/>
+          </a:prstGeom>
+          <a:ln>
+            <a:headEnd type="none" w="med" len="med"/>
+            <a:tailEnd type="none" w="med" len="med"/>
+          </a:ln>
+        </p:spPr>
+        <p:style>
+          <a:lnRef idx="1">
+            <a:schemeClr val="dk1"/>
+          </a:lnRef>
+          <a:fillRef idx="3">
+            <a:schemeClr val="dk1"/>
+          </a:fillRef>
+          <a:effectRef idx="2">
+            <a:schemeClr val="dk1"/>
+          </a:effectRef>
+          <a:fontRef idx="minor">
+            <a:schemeClr val="lt1"/>
+          </a:fontRef>
+        </p:style>
+        <p:txBody>
+          <a:bodyPr vert="horz" wrap="square" lIns="72000" tIns="46800" rIns="72000" bIns="46800" numCol="1" rtlCol="0" anchor="ctr" anchorCtr="0" compatLnSpc="1">
+            <a:prstTxWarp prst="textNoShape">
+              <a:avLst/>
+            </a:prstTxWarp>
+          </a:bodyPr>
+          <a:lstStyle/>
+          <a:p>
+            <a:pPr algn="ctr"/>
+            <a:r>
+              <a:rPr lang="de-DE" sz="1200" dirty="0">
+                <a:solidFill>
+                  <a:schemeClr val="bg1"/>
+                </a:solidFill>
+              </a:rPr>
+              <a:t>Technical </a:t>
+            </a:r>
+            <a:r>
+              <a:rPr lang="de-DE" sz="1200" dirty="0" err="1">
+                <a:solidFill>
+                  <a:schemeClr val="bg1"/>
+                </a:solidFill>
+              </a:rPr>
+              <a:t>Aspects</a:t>
+            </a:r>
+            <a:endParaRPr lang="de-DE" sz="1200" dirty="0">
+              <a:solidFill>
+                <a:schemeClr val="bg1"/>
+              </a:solidFill>
+            </a:endParaRPr>
+          </a:p>
+        </p:txBody>
+      </p:sp>
+      <p:sp>
+        <p:nvSpPr>
+          <p:cNvPr id="32" name="Rechteck 31"/>
+          <p:cNvSpPr/>
+          <p:nvPr/>
+        </p:nvSpPr>
+        <p:spPr bwMode="auto">
+          <a:xfrm>
+            <a:off x="5849969" y="5730303"/>
+            <a:ext cx="1224136" cy="1008112"/>
+          </a:xfrm>
+          <a:prstGeom prst="rect">
+            <a:avLst/>
+          </a:prstGeom>
+          <a:ln>
+            <a:headEnd type="none" w="med" len="med"/>
+            <a:tailEnd type="none" w="med" len="med"/>
+          </a:ln>
+        </p:spPr>
+        <p:style>
+          <a:lnRef idx="1">
+            <a:schemeClr val="dk1"/>
+          </a:lnRef>
+          <a:fillRef idx="3">
+            <a:schemeClr val="dk1"/>
+          </a:fillRef>
+          <a:effectRef idx="2">
+            <a:schemeClr val="dk1"/>
+          </a:effectRef>
+          <a:fontRef idx="minor">
+            <a:schemeClr val="lt1"/>
+          </a:fontRef>
+        </p:style>
+        <p:txBody>
+          <a:bodyPr vert="horz" wrap="square" lIns="72000" tIns="46800" rIns="72000" bIns="46800" numCol="1" rtlCol="0" anchor="ctr" anchorCtr="0" compatLnSpc="1">
+            <a:prstTxWarp prst="textNoShape">
+              <a:avLst/>
+            </a:prstTxWarp>
+          </a:bodyPr>
+          <a:lstStyle/>
+          <a:p>
+            <a:pPr algn="ctr"/>
+            <a:r>
+              <a:rPr lang="de-DE" sz="1200" dirty="0" smtClean="0">
+                <a:solidFill>
+                  <a:schemeClr val="bg1"/>
+                </a:solidFill>
+              </a:rPr>
+              <a:t>User Guide</a:t>
+            </a:r>
+            <a:endParaRPr lang="de-DE" sz="1200" dirty="0">
+              <a:solidFill>
+                <a:schemeClr val="bg1"/>
+              </a:solidFill>
+            </a:endParaRPr>
+          </a:p>
+        </p:txBody>
+      </p:sp>
+    </p:spTree>
+    <p:extLst>
+      <p:ext uri="{BB962C8B-B14F-4D97-AF65-F5344CB8AC3E}">
+        <p14:creationId xmlns:p14="http://schemas.microsoft.com/office/powerpoint/2010/main" val="2345714343"/>
       </p:ext>
     </p:extLst>
   </p:cSld>

</xml_diff>